<commit_message>
upadte website, colors and bullets
</commit_message>
<xml_diff>
--- a/server/uploads/semi.pptx
+++ b/server/uploads/semi.pptx
@@ -203,7 +203,7 @@
           <a:p>
             <a:fld id="{539CA35F-CF30-498C-A37F-E4B404332AB8}" type="datetimeFigureOut">
               <a:rPr lang="he-IL" smtClean="0"/>
-              <a:t>כ"ג/ניסן/תשפ"ב</a:t>
+              <a:t>ט"ו/אייר/תשפ"ב</a:t>
             </a:fld>
             <a:endParaRPr lang="he-IL"/>
           </a:p>
@@ -1229,7 +1229,7 @@
           <a:p>
             <a:fld id="{D880ED0C-7ADE-460C-BE75-9767167AE7C5}" type="datetimeFigureOut">
               <a:rPr lang="he-IL" smtClean="0"/>
-              <a:t>כ"ג/ניסן/תשפ"ב</a:t>
+              <a:t>ט"ו/אייר/תשפ"ב</a:t>
             </a:fld>
             <a:endParaRPr lang="he-IL"/>
           </a:p>
@@ -1427,7 +1427,7 @@
           <a:p>
             <a:fld id="{D880ED0C-7ADE-460C-BE75-9767167AE7C5}" type="datetimeFigureOut">
               <a:rPr lang="he-IL" smtClean="0"/>
-              <a:t>כ"ג/ניסן/תשפ"ב</a:t>
+              <a:t>ט"ו/אייר/תשפ"ב</a:t>
             </a:fld>
             <a:endParaRPr lang="he-IL"/>
           </a:p>
@@ -1635,7 +1635,7 @@
           <a:p>
             <a:fld id="{D880ED0C-7ADE-460C-BE75-9767167AE7C5}" type="datetimeFigureOut">
               <a:rPr lang="he-IL" smtClean="0"/>
-              <a:t>כ"ג/ניסן/תשפ"ב</a:t>
+              <a:t>ט"ו/אייר/תשפ"ב</a:t>
             </a:fld>
             <a:endParaRPr lang="he-IL"/>
           </a:p>
@@ -1833,7 +1833,7 @@
           <a:p>
             <a:fld id="{D880ED0C-7ADE-460C-BE75-9767167AE7C5}" type="datetimeFigureOut">
               <a:rPr lang="he-IL" smtClean="0"/>
-              <a:t>כ"ג/ניסן/תשפ"ב</a:t>
+              <a:t>ט"ו/אייר/תשפ"ב</a:t>
             </a:fld>
             <a:endParaRPr lang="he-IL"/>
           </a:p>
@@ -2108,7 +2108,7 @@
           <a:p>
             <a:fld id="{D880ED0C-7ADE-460C-BE75-9767167AE7C5}" type="datetimeFigureOut">
               <a:rPr lang="he-IL" smtClean="0"/>
-              <a:t>כ"ג/ניסן/תשפ"ב</a:t>
+              <a:t>ט"ו/אייר/תשפ"ב</a:t>
             </a:fld>
             <a:endParaRPr lang="he-IL"/>
           </a:p>
@@ -2373,7 +2373,7 @@
           <a:p>
             <a:fld id="{D880ED0C-7ADE-460C-BE75-9767167AE7C5}" type="datetimeFigureOut">
               <a:rPr lang="he-IL" smtClean="0"/>
-              <a:t>כ"ג/ניסן/תשפ"ב</a:t>
+              <a:t>ט"ו/אייר/תשפ"ב</a:t>
             </a:fld>
             <a:endParaRPr lang="he-IL"/>
           </a:p>
@@ -2785,7 +2785,7 @@
           <a:p>
             <a:fld id="{D880ED0C-7ADE-460C-BE75-9767167AE7C5}" type="datetimeFigureOut">
               <a:rPr lang="he-IL" smtClean="0"/>
-              <a:t>כ"ג/ניסן/תשפ"ב</a:t>
+              <a:t>ט"ו/אייר/תשפ"ב</a:t>
             </a:fld>
             <a:endParaRPr lang="he-IL"/>
           </a:p>
@@ -2926,7 +2926,7 @@
           <a:p>
             <a:fld id="{D880ED0C-7ADE-460C-BE75-9767167AE7C5}" type="datetimeFigureOut">
               <a:rPr lang="he-IL" smtClean="0"/>
-              <a:t>כ"ג/ניסן/תשפ"ב</a:t>
+              <a:t>ט"ו/אייר/תשפ"ב</a:t>
             </a:fld>
             <a:endParaRPr lang="he-IL"/>
           </a:p>
@@ -3039,7 +3039,7 @@
           <a:p>
             <a:fld id="{D880ED0C-7ADE-460C-BE75-9767167AE7C5}" type="datetimeFigureOut">
               <a:rPr lang="he-IL" smtClean="0"/>
-              <a:t>כ"ג/ניסן/תשפ"ב</a:t>
+              <a:t>ט"ו/אייר/תשפ"ב</a:t>
             </a:fld>
             <a:endParaRPr lang="he-IL"/>
           </a:p>
@@ -3350,7 +3350,7 @@
           <a:p>
             <a:fld id="{D880ED0C-7ADE-460C-BE75-9767167AE7C5}" type="datetimeFigureOut">
               <a:rPr lang="he-IL" smtClean="0"/>
-              <a:t>כ"ג/ניסן/תשפ"ב</a:t>
+              <a:t>ט"ו/אייר/תשפ"ב</a:t>
             </a:fld>
             <a:endParaRPr lang="he-IL"/>
           </a:p>
@@ -3638,7 +3638,7 @@
           <a:p>
             <a:fld id="{D880ED0C-7ADE-460C-BE75-9767167AE7C5}" type="datetimeFigureOut">
               <a:rPr lang="he-IL" smtClean="0"/>
-              <a:t>כ"ג/ניסן/תשפ"ב</a:t>
+              <a:t>ט"ו/אייר/תשפ"ב</a:t>
             </a:fld>
             <a:endParaRPr lang="he-IL"/>
           </a:p>
@@ -3879,7 +3879,7 @@
           <a:p>
             <a:fld id="{D880ED0C-7ADE-460C-BE75-9767167AE7C5}" type="datetimeFigureOut">
               <a:rPr lang="he-IL" smtClean="0"/>
-              <a:t>כ"ג/ניסן/תשפ"ב</a:t>
+              <a:t>ט"ו/אייר/תשפ"ב</a:t>
             </a:fld>
             <a:endParaRPr lang="he-IL"/>
           </a:p>
@@ -4929,8 +4929,8 @@
         </p:blipFill>
         <p:spPr>
           <a:xfrm>
-            <a:off x="6604870" y="4105192"/>
-            <a:ext cx="5247523" cy="2632038"/>
+            <a:off x="8143233" y="4876800"/>
+            <a:ext cx="3709160" cy="1860430"/>
           </a:xfrm>
           <a:prstGeom prst="rect">
             <a:avLst/>
@@ -5092,6 +5092,16 @@
 <file path=ppt/slides/slide4.xml><?xml version="1.0" encoding="utf-8"?>
 <p:sld xmlns:a="http://schemas.openxmlformats.org/drawingml/2006/main" xmlns:r="http://schemas.openxmlformats.org/officeDocument/2006/relationships" xmlns:p="http://schemas.openxmlformats.org/presentationml/2006/main">
   <p:cSld>
+    <p:bg>
+      <p:bgPr>
+        <a:solidFill>
+          <a:schemeClr val="accent2">
+            <a:lumMod val="75000"/>
+          </a:schemeClr>
+        </a:solidFill>
+        <a:effectLst/>
+      </p:bgPr>
+    </p:bg>
     <p:spTree>
       <p:nvGrpSpPr>
         <p:cNvPr id="1" name=""/>
@@ -5345,8 +5355,8 @@
         </p:blipFill>
         <p:spPr bwMode="auto">
           <a:xfrm>
-            <a:off x="7212725" y="2737663"/>
-            <a:ext cx="3910764" cy="4120337"/>
+            <a:off x="9185345" y="3876778"/>
+            <a:ext cx="2421239" cy="2550990"/>
           </a:xfrm>
           <a:prstGeom prst="rect">
             <a:avLst/>
@@ -5769,7 +5779,7 @@
         </p:nvSpPr>
         <p:spPr>
           <a:xfrm>
-            <a:off x="1173192" y="2225553"/>
+            <a:off x="1079407" y="1838692"/>
             <a:ext cx="11984966" cy="1951496"/>
           </a:xfrm>
           <a:prstGeom prst="rect">

</xml_diff>